<commit_message>
updated slides for ICEG of 26/6
</commit_message>
<xml_diff>
--- a/Meetings/2024-06-12/ICEG_standardisation_20240626.pptx
+++ b/Meetings/2024-06-12/ICEG_standardisation_20240626.pptx
@@ -8,10 +8,10 @@
     <p:sldMasterId id="2147483715" r:id="rId7"/>
   </p:sldMasterIdLst>
   <p:notesMasterIdLst>
-    <p:notesMasterId r:id="rId16"/>
+    <p:notesMasterId r:id="rId17"/>
   </p:notesMasterIdLst>
   <p:handoutMasterIdLst>
-    <p:handoutMasterId r:id="rId17"/>
+    <p:handoutMasterId r:id="rId18"/>
   </p:handoutMasterIdLst>
   <p:sldIdLst>
     <p:sldId id="464" r:id="rId8"/>
@@ -19,9 +19,10 @@
     <p:sldId id="527" r:id="rId10"/>
     <p:sldId id="534" r:id="rId11"/>
     <p:sldId id="536" r:id="rId12"/>
-    <p:sldId id="537" r:id="rId13"/>
-    <p:sldId id="530" r:id="rId14"/>
-    <p:sldId id="522" r:id="rId15"/>
+    <p:sldId id="538" r:id="rId13"/>
+    <p:sldId id="537" r:id="rId14"/>
+    <p:sldId id="530" r:id="rId15"/>
+    <p:sldId id="522" r:id="rId16"/>
   </p:sldIdLst>
   <p:sldSz cx="9144000" cy="6858000" type="screen4x3"/>
   <p:notesSz cx="6797675" cy="9926638"/>
@@ -125,6 +126,14 @@
 <p188:authorLst xmlns:a="http://schemas.openxmlformats.org/drawingml/2006/main" xmlns:r="http://schemas.openxmlformats.org/officeDocument/2006/relationships" xmlns:p188="http://schemas.microsoft.com/office/powerpoint/2018/8/main">
   <p188:author id="{00000000-0000-0000-0000-000000000000}" name="Auteur" initials="A" userId="Author" providerId="AD"/>
 </p188:authorLst>
+</file>
+
+<file path=ppt/revisionInfo.xml><?xml version="1.0" encoding="utf-8"?>
+<p1510:revInfo xmlns:a="http://schemas.openxmlformats.org/drawingml/2006/main" xmlns:r="http://schemas.openxmlformats.org/officeDocument/2006/relationships" xmlns:p1510="http://schemas.microsoft.com/office/powerpoint/2015/10/main">
+  <p1510:revLst>
+    <p1510:client id="{21829DAD-BB14-4338-BA6C-B56E57A28A04}" v="3" dt="2024-06-12T13:48:48.387"/>
+  </p1510:revLst>
+</p1510:revInfo>
 </file>
 
 <file path=ppt/handoutMasters/handoutMaster1.xml><?xml version="1.0" encoding="utf-8"?>
@@ -14895,20 +14904,12 @@
           <a:p>
             <a:pPr algn="ctr"/>
             <a:r>
-              <a:rPr lang="en-US" sz="3400" b="0">
-                <a:solidFill>
-                  <a:schemeClr val="bg1"/>
-                </a:solidFill>
-              </a:rPr>
-              <a:t>June </a:t>
-            </a:r>
-            <a:r>
               <a:rPr lang="en-US" sz="3400" b="0" dirty="0">
                 <a:solidFill>
                   <a:schemeClr val="bg1"/>
                 </a:solidFill>
               </a:rPr>
-              <a:t>26</a:t>
+              <a:t>June 26</a:t>
             </a:r>
             <a:r>
               <a:rPr lang="en-US" sz="3400" b="0" baseline="30000" dirty="0">
@@ -14959,7 +14960,23 @@
                   <a:schemeClr val="bg1"/>
                 </a:solidFill>
               </a:rPr>
-              <a:t>XXX</a:t>
+              <a:t>Eric </a:t>
+            </a:r>
+            <a:r>
+              <a:rPr lang="en-US" sz="2000" b="0" dirty="0" err="1">
+                <a:solidFill>
+                  <a:schemeClr val="bg1"/>
+                </a:solidFill>
+              </a:rPr>
+              <a:t>Auquière</a:t>
+            </a:r>
+            <a:r>
+              <a:rPr lang="en-US" sz="2000" b="0" dirty="0">
+                <a:solidFill>
+                  <a:schemeClr val="bg1"/>
+                </a:solidFill>
+              </a:rPr>
+              <a:t>, Rink Kruk</a:t>
             </a:r>
             <a:endParaRPr lang="en-US" sz="4600" b="0" dirty="0">
               <a:solidFill>
@@ -16168,7 +16185,7 @@
             </a:r>
             <a:r>
               <a:rPr lang="nl-BE" sz="2000" dirty="0" err="1"/>
-              <a:t>colaboration</a:t>
+              <a:t>collaboration</a:t>
             </a:r>
             <a:r>
               <a:rPr lang="nl-BE" sz="2000" dirty="0"/>
@@ -16585,19 +16602,43 @@
           <a:p>
             <a:pPr lvl="1"/>
             <a:r>
-              <a:rPr lang="nl-BE" sz="2000" b="1" dirty="0"/>
-              <a:t>Persons</a:t>
+              <a:rPr lang="nl-BE" sz="2000" dirty="0" err="1"/>
+              <a:t>Request</a:t>
             </a:r>
             <a:r>
               <a:rPr lang="nl-BE" sz="2000" dirty="0"/>
-              <a:t>: 1-pager</a:t>
+              <a:t> </a:t>
+            </a:r>
+            <a:r>
+              <a:rPr lang="nl-BE" sz="2000" dirty="0" err="1"/>
+              <a:t>to</a:t>
+            </a:r>
+            <a:r>
+              <a:rPr lang="nl-BE" sz="2000" dirty="0"/>
+              <a:t> start a new </a:t>
+            </a:r>
+            <a:r>
+              <a:rPr lang="nl-BE" sz="2000" dirty="0" err="1"/>
+              <a:t>standardization</a:t>
+            </a:r>
+            <a:r>
+              <a:rPr lang="nl-BE" sz="2000" dirty="0"/>
+              <a:t> </a:t>
+            </a:r>
+            <a:r>
+              <a:rPr lang="nl-BE" sz="2000" dirty="0" err="1"/>
+              <a:t>trajectory</a:t>
+            </a:r>
+            <a:r>
+              <a:rPr lang="nl-BE" sz="2000" dirty="0"/>
+              <a:t>:</a:t>
             </a:r>
           </a:p>
           <a:p>
             <a:pPr lvl="2"/>
             <a:r>
               <a:rPr lang="nl-BE" sz="2000" dirty="0"/>
-              <a:t>Additional budget </a:t>
+              <a:t>Budget </a:t>
             </a:r>
             <a:r>
               <a:rPr lang="nl-BE" sz="2000" dirty="0" err="1"/>
@@ -16611,8 +16652,20 @@
           <a:p>
             <a:pPr lvl="2"/>
             <a:r>
+              <a:rPr lang="nl-BE" sz="2000" dirty="0" err="1"/>
+              <a:t>Approval</a:t>
+            </a:r>
+            <a:r>
               <a:rPr lang="nl-BE" sz="2000" dirty="0"/>
-              <a:t>Approval for budget </a:t>
+              <a:t> </a:t>
+            </a:r>
+            <a:r>
+              <a:rPr lang="nl-BE" sz="2000" dirty="0" err="1"/>
+              <a:t>for</a:t>
+            </a:r>
+            <a:r>
+              <a:rPr lang="nl-BE" sz="2000" dirty="0"/>
+              <a:t> budget </a:t>
             </a:r>
             <a:r>
               <a:rPr lang="nl-BE" sz="2000" dirty="0" err="1"/>
@@ -16670,11 +16723,6 @@
               <a:rPr lang="nl-BE" sz="2000" dirty="0"/>
               <a:t>)</a:t>
             </a:r>
-            <a:endParaRPr lang="nl-BE" sz="1800" dirty="0"/>
-          </a:p>
-          <a:p>
-            <a:pPr lvl="1"/>
-            <a:endParaRPr lang="nl-BE" sz="2000" dirty="0"/>
           </a:p>
         </p:txBody>
       </p:sp>
@@ -16692,7 +16740,7 @@
         </p:nvSpPr>
         <p:spPr>
           <a:xfrm>
-            <a:off x="539552" y="3284984"/>
+            <a:off x="457200" y="2557841"/>
             <a:ext cx="720080" cy="288032"/>
           </a:xfrm>
           <a:prstGeom prst="rightArrow">
@@ -16857,6 +16905,438 @@
             <a:fld id="{44268F58-7931-46A9-8276-28F54B6737CA}" type="slidenum">
               <a:rPr lang="fr-BE" smtClean="0"/>
               <a:t>6</a:t>
+            </a:fld>
+            <a:endParaRPr lang="fr-BE"/>
+          </a:p>
+        </p:txBody>
+      </p:sp>
+      <p:sp>
+        <p:nvSpPr>
+          <p:cNvPr id="5" name="Content Placeholder 2">
+            <a:extLst>
+              <a:ext uri="{FF2B5EF4-FFF2-40B4-BE49-F238E27FC236}">
+                <a16:creationId xmlns:a16="http://schemas.microsoft.com/office/drawing/2014/main" id="{9BBAB1BB-7A4B-31D8-B460-B8472D32BA84}"/>
+              </a:ext>
+            </a:extLst>
+          </p:cNvPr>
+          <p:cNvSpPr>
+            <a:spLocks noGrp="1"/>
+          </p:cNvSpPr>
+          <p:nvPr>
+            <p:ph idx="1"/>
+          </p:nvPr>
+        </p:nvSpPr>
+        <p:spPr>
+          <a:xfrm>
+            <a:off x="348400" y="1124744"/>
+            <a:ext cx="8447200" cy="4158805"/>
+          </a:xfrm>
+        </p:spPr>
+        <p:txBody>
+          <a:bodyPr>
+            <a:normAutofit/>
+          </a:bodyPr>
+          <a:lstStyle/>
+          <a:p>
+            <a:r>
+              <a:rPr lang="nl-BE" sz="2000" dirty="0"/>
+              <a:t>On </a:t>
+            </a:r>
+            <a:r>
+              <a:rPr lang="nl-BE" sz="2000" dirty="0" err="1"/>
+              <a:t>hold</a:t>
+            </a:r>
+            <a:r>
+              <a:rPr lang="nl-BE" sz="2000" dirty="0"/>
+              <a:t> (</a:t>
+            </a:r>
+            <a:r>
+              <a:rPr lang="nl-BE" sz="2000" dirty="0" err="1"/>
+              <a:t>waiting</a:t>
+            </a:r>
+            <a:r>
+              <a:rPr lang="nl-BE" sz="2000" dirty="0"/>
+              <a:t> </a:t>
+            </a:r>
+            <a:r>
+              <a:rPr lang="nl-BE" sz="2000" dirty="0" err="1"/>
+              <a:t>for</a:t>
+            </a:r>
+            <a:r>
+              <a:rPr lang="nl-BE" sz="2000" dirty="0"/>
+              <a:t> </a:t>
+            </a:r>
+            <a:r>
+              <a:rPr lang="nl-BE" sz="2000" dirty="0" err="1"/>
+              <a:t>signing</a:t>
+            </a:r>
+            <a:r>
+              <a:rPr lang="nl-BE" sz="2000" dirty="0"/>
+              <a:t> of </a:t>
+            </a:r>
+            <a:r>
+              <a:rPr lang="nl-BE" sz="2000" dirty="0" err="1"/>
+              <a:t>the</a:t>
+            </a:r>
+            <a:r>
+              <a:rPr lang="nl-BE" sz="2000" dirty="0"/>
+              <a:t> </a:t>
+            </a:r>
+            <a:r>
+              <a:rPr lang="nl-BE" sz="2000" dirty="0" err="1"/>
+              <a:t>renewed</a:t>
+            </a:r>
+            <a:r>
+              <a:rPr lang="nl-BE" sz="2000" dirty="0"/>
+              <a:t> </a:t>
+            </a:r>
+            <a:r>
+              <a:rPr lang="nl-BE" sz="2000" dirty="0" err="1"/>
+              <a:t>collaboration</a:t>
+            </a:r>
+            <a:r>
+              <a:rPr lang="nl-BE" sz="2000" dirty="0"/>
+              <a:t> agreement)</a:t>
+            </a:r>
+          </a:p>
+          <a:p>
+            <a:pPr lvl="1"/>
+            <a:r>
+              <a:rPr lang="nl-BE" sz="2000" b="1" dirty="0"/>
+              <a:t>Persons</a:t>
+            </a:r>
+            <a:r>
+              <a:rPr lang="nl-BE" sz="2000" dirty="0"/>
+              <a:t>: </a:t>
+            </a:r>
+            <a:r>
+              <a:rPr lang="nl-BE" sz="2000" dirty="0" err="1"/>
+              <a:t>one</a:t>
+            </a:r>
+            <a:r>
+              <a:rPr lang="nl-BE" sz="2000" dirty="0"/>
+              <a:t>-pager</a:t>
+            </a:r>
+          </a:p>
+          <a:p>
+            <a:pPr lvl="2"/>
+            <a:r>
+              <a:rPr lang="nl-BE" sz="2000" dirty="0" err="1"/>
+              <a:t>request</a:t>
+            </a:r>
+            <a:r>
+              <a:rPr lang="nl-BE" sz="2000" dirty="0"/>
+              <a:t> </a:t>
+            </a:r>
+            <a:r>
+              <a:rPr lang="nl-BE" sz="2000" dirty="0" err="1"/>
+              <a:t>to</a:t>
+            </a:r>
+            <a:r>
+              <a:rPr lang="nl-BE" sz="2000" dirty="0"/>
+              <a:t> </a:t>
+            </a:r>
+            <a:r>
+              <a:rPr lang="nl-BE" sz="2000" dirty="0" err="1"/>
+              <a:t>send</a:t>
+            </a:r>
+            <a:r>
+              <a:rPr lang="nl-BE" sz="2000" dirty="0"/>
+              <a:t> a </a:t>
+            </a:r>
+            <a:r>
+              <a:rPr lang="nl-BE" sz="2000" dirty="0" err="1"/>
+              <a:t>message</a:t>
+            </a:r>
+            <a:r>
+              <a:rPr lang="nl-BE" sz="2000" dirty="0"/>
+              <a:t> </a:t>
+            </a:r>
+            <a:r>
+              <a:rPr lang="nl-BE" sz="2000" dirty="0" err="1"/>
+              <a:t>to</a:t>
+            </a:r>
+            <a:r>
+              <a:rPr lang="nl-BE" sz="2000" dirty="0"/>
+              <a:t> </a:t>
+            </a:r>
+            <a:r>
+              <a:rPr lang="nl-BE" sz="2000" dirty="0" err="1"/>
+              <a:t>the</a:t>
+            </a:r>
+            <a:r>
+              <a:rPr lang="nl-BE" sz="2000" dirty="0"/>
+              <a:t> National Register </a:t>
+            </a:r>
+            <a:r>
+              <a:rPr lang="nl-BE" sz="2000" dirty="0" err="1"/>
+              <a:t>and</a:t>
+            </a:r>
+            <a:r>
+              <a:rPr lang="nl-BE" sz="2000" dirty="0"/>
+              <a:t> KSZ/BCSS </a:t>
+            </a:r>
+            <a:r>
+              <a:rPr lang="nl-BE" sz="2000" dirty="0" err="1"/>
+              <a:t>to</a:t>
+            </a:r>
+            <a:r>
+              <a:rPr lang="nl-BE" sz="2000" dirty="0"/>
+              <a:t> </a:t>
+            </a:r>
+            <a:r>
+              <a:rPr lang="nl-BE" sz="2000" dirty="0" err="1"/>
+              <a:t>request</a:t>
+            </a:r>
+            <a:r>
+              <a:rPr lang="nl-BE" sz="2000" dirty="0"/>
+              <a:t> </a:t>
+            </a:r>
+            <a:r>
+              <a:rPr lang="nl-BE" sz="2000" dirty="0" err="1"/>
+              <a:t>their</a:t>
+            </a:r>
+            <a:r>
+              <a:rPr lang="nl-BE" sz="2000" dirty="0"/>
+              <a:t> support </a:t>
+            </a:r>
+            <a:r>
+              <a:rPr lang="nl-BE" sz="2000" dirty="0" err="1"/>
+              <a:t>for</a:t>
+            </a:r>
+            <a:r>
+              <a:rPr lang="nl-BE" sz="2000" dirty="0"/>
+              <a:t> </a:t>
+            </a:r>
+            <a:r>
+              <a:rPr lang="nl-BE" sz="2000" dirty="0" err="1"/>
+              <a:t>this</a:t>
+            </a:r>
+            <a:r>
+              <a:rPr lang="nl-BE" sz="2000" dirty="0"/>
+              <a:t> </a:t>
+            </a:r>
+            <a:r>
+              <a:rPr lang="nl-BE" sz="2000" dirty="0" err="1"/>
+              <a:t>exercise</a:t>
+            </a:r>
+            <a:endParaRPr lang="nl-BE" sz="2000" dirty="0"/>
+          </a:p>
+          <a:p>
+            <a:pPr lvl="1"/>
+            <a:endParaRPr lang="nl-BE" sz="2000" dirty="0"/>
+          </a:p>
+        </p:txBody>
+      </p:sp>
+      <p:sp>
+        <p:nvSpPr>
+          <p:cNvPr id="6" name="Arrow: Right 5">
+            <a:extLst>
+              <a:ext uri="{FF2B5EF4-FFF2-40B4-BE49-F238E27FC236}">
+                <a16:creationId xmlns:a16="http://schemas.microsoft.com/office/drawing/2014/main" id="{6F0E62ED-E547-E54A-1E12-6BB4ECB360B2}"/>
+              </a:ext>
+            </a:extLst>
+          </p:cNvPr>
+          <p:cNvSpPr/>
+          <p:nvPr/>
+        </p:nvSpPr>
+        <p:spPr>
+          <a:xfrm>
+            <a:off x="683568" y="1974192"/>
+            <a:ext cx="720080" cy="288032"/>
+          </a:xfrm>
+          <a:prstGeom prst="rightArrow">
+            <a:avLst/>
+          </a:prstGeom>
+          <a:solidFill>
+            <a:srgbClr val="FF0000"/>
+          </a:solidFill>
+          <a:ln w="25400" cap="flat">
+            <a:solidFill>
+              <a:srgbClr val="FF0000"/>
+            </a:solidFill>
+            <a:prstDash val="solid"/>
+            <a:bevel/>
+          </a:ln>
+          <a:effectLst>
+            <a:outerShdw blurRad="38100" dist="23000" dir="5400000" rotWithShape="0">
+              <a:srgbClr val="000000">
+                <a:alpha val="35000"/>
+              </a:srgbClr>
+            </a:outerShdw>
+          </a:effectLst>
+        </p:spPr>
+        <p:style>
+          <a:lnRef idx="0">
+            <a:scrgbClr r="0" g="0" b="0"/>
+          </a:lnRef>
+          <a:fillRef idx="0">
+            <a:scrgbClr r="0" g="0" b="0"/>
+          </a:fillRef>
+          <a:effectRef idx="0">
+            <a:scrgbClr r="0" g="0" b="0"/>
+          </a:effectRef>
+          <a:fontRef idx="none"/>
+        </p:style>
+        <p:txBody>
+          <a:bodyPr rot="0" spcFirstLastPara="1" vertOverflow="overflow" horzOverflow="overflow" vert="horz" wrap="square" lIns="45719" tIns="45719" rIns="45719" bIns="45719" numCol="1" spcCol="38100" rtlCol="0" anchor="ctr">
+            <a:spAutoFit/>
+          </a:bodyPr>
+          <a:lstStyle/>
+          <a:p>
+            <a:pPr marL="0" marR="0" indent="0" algn="l" defTabSz="914400" rtl="0" fontAlgn="auto" latinLnBrk="1" hangingPunct="0">
+              <a:lnSpc>
+                <a:spcPct val="100000"/>
+              </a:lnSpc>
+              <a:spcBef>
+                <a:spcPts val="0"/>
+              </a:spcBef>
+              <a:spcAft>
+                <a:spcPts val="0"/>
+              </a:spcAft>
+              <a:buClrTx/>
+              <a:buSzTx/>
+              <a:buFontTx/>
+              <a:buNone/>
+              <a:tabLst/>
+            </a:pPr>
+            <a:endParaRPr kumimoji="0" lang="nl-BE" sz="1800" b="0" i="0" u="none" strike="noStrike" cap="none" spc="0" normalizeH="0" baseline="0">
+              <a:ln>
+                <a:noFill/>
+              </a:ln>
+              <a:solidFill>
+                <a:srgbClr val="000000"/>
+              </a:solidFill>
+              <a:effectLst/>
+              <a:uFillTx/>
+              <a:latin typeface="FlandersArtSans-Regular"/>
+              <a:ea typeface="FlandersArtSans-Regular"/>
+              <a:cs typeface="FlandersArtSans-Regular"/>
+              <a:sym typeface="FlandersArtSans-Regular"/>
+            </a:endParaRPr>
+          </a:p>
+        </p:txBody>
+      </p:sp>
+      <p:pic>
+        <p:nvPicPr>
+          <p:cNvPr id="8" name="Picture 7">
+            <a:extLst>
+              <a:ext uri="{FF2B5EF4-FFF2-40B4-BE49-F238E27FC236}">
+                <a16:creationId xmlns:a16="http://schemas.microsoft.com/office/drawing/2014/main" id="{EB4B0CE7-808C-C60C-491D-01785BD90433}"/>
+              </a:ext>
+            </a:extLst>
+          </p:cNvPr>
+          <p:cNvPicPr>
+            <a:picLocks noChangeAspect="1"/>
+          </p:cNvPicPr>
+          <p:nvPr/>
+        </p:nvPicPr>
+        <p:blipFill>
+          <a:blip r:embed="rId2"/>
+          <a:stretch>
+            <a:fillRect/>
+          </a:stretch>
+        </p:blipFill>
+        <p:spPr>
+          <a:xfrm>
+            <a:off x="1547664" y="2704487"/>
+            <a:ext cx="5811624" cy="4009285"/>
+          </a:xfrm>
+          <a:prstGeom prst="rect">
+            <a:avLst/>
+          </a:prstGeom>
+        </p:spPr>
+      </p:pic>
+    </p:spTree>
+    <p:extLst>
+      <p:ext uri="{BB962C8B-B14F-4D97-AF65-F5344CB8AC3E}">
+        <p14:creationId xmlns:p14="http://schemas.microsoft.com/office/powerpoint/2010/main" val="4225633794"/>
+      </p:ext>
+    </p:extLst>
+  </p:cSld>
+  <p:clrMapOvr>
+    <a:masterClrMapping/>
+  </p:clrMapOvr>
+</p:sld>
+</file>
+
+<file path=ppt/slides/slide7.xml><?xml version="1.0" encoding="utf-8"?>
+<p:sld xmlns:a="http://schemas.openxmlformats.org/drawingml/2006/main" xmlns:r="http://schemas.openxmlformats.org/officeDocument/2006/relationships" xmlns:p="http://schemas.openxmlformats.org/presentationml/2006/main">
+  <p:cSld>
+    <p:spTree>
+      <p:nvGrpSpPr>
+        <p:cNvPr id="1" name=""/>
+        <p:cNvGrpSpPr/>
+        <p:nvPr/>
+      </p:nvGrpSpPr>
+      <p:grpSpPr>
+        <a:xfrm>
+          <a:off x="0" y="0"/>
+          <a:ext cx="0" cy="0"/>
+          <a:chOff x="0" y="0"/>
+          <a:chExt cx="0" cy="0"/>
+        </a:xfrm>
+      </p:grpSpPr>
+      <p:sp>
+        <p:nvSpPr>
+          <p:cNvPr id="2" name="Title 1">
+            <a:extLst>
+              <a:ext uri="{FF2B5EF4-FFF2-40B4-BE49-F238E27FC236}">
+                <a16:creationId xmlns:a16="http://schemas.microsoft.com/office/drawing/2014/main" id="{8CA2F23D-A3D3-4A87-861E-6A824CBAE7B5}"/>
+              </a:ext>
+            </a:extLst>
+          </p:cNvPr>
+          <p:cNvSpPr>
+            <a:spLocks noGrp="1"/>
+          </p:cNvSpPr>
+          <p:nvPr>
+            <p:ph type="title"/>
+          </p:nvPr>
+        </p:nvSpPr>
+        <p:spPr/>
+        <p:txBody>
+          <a:bodyPr/>
+          <a:lstStyle/>
+          <a:p>
+            <a:r>
+              <a:rPr lang="nl-BE" dirty="0"/>
+              <a:t>Data </a:t>
+            </a:r>
+            <a:r>
+              <a:rPr lang="nl-BE" dirty="0" err="1"/>
+              <a:t>standardization</a:t>
+            </a:r>
+            <a:r>
+              <a:rPr lang="nl-BE" dirty="0"/>
+              <a:t> – status </a:t>
+            </a:r>
+          </a:p>
+        </p:txBody>
+      </p:sp>
+      <p:sp>
+        <p:nvSpPr>
+          <p:cNvPr id="4" name="Slide Number Placeholder 3">
+            <a:extLst>
+              <a:ext uri="{FF2B5EF4-FFF2-40B4-BE49-F238E27FC236}">
+                <a16:creationId xmlns:a16="http://schemas.microsoft.com/office/drawing/2014/main" id="{55A28673-8C64-4BAF-95DB-4062F1621266}"/>
+              </a:ext>
+            </a:extLst>
+          </p:cNvPr>
+          <p:cNvSpPr>
+            <a:spLocks noGrp="1"/>
+          </p:cNvSpPr>
+          <p:nvPr>
+            <p:ph type="sldNum" sz="quarter" idx="12"/>
+          </p:nvPr>
+        </p:nvSpPr>
+        <p:spPr/>
+        <p:txBody>
+          <a:bodyPr/>
+          <a:lstStyle/>
+          <a:p>
+            <a:fld id="{44268F58-7931-46A9-8276-28F54B6737CA}" type="slidenum">
+              <a:rPr lang="fr-BE" smtClean="0"/>
+              <a:t>7</a:t>
             </a:fld>
             <a:endParaRPr lang="fr-BE"/>
           </a:p>
@@ -17202,7 +17682,7 @@
 </p:sld>
 </file>
 
-<file path=ppt/slides/slide7.xml><?xml version="1.0" encoding="utf-8"?>
+<file path=ppt/slides/slide8.xml><?xml version="1.0" encoding="utf-8"?>
 <p:sld xmlns:a="http://schemas.openxmlformats.org/drawingml/2006/main" xmlns:r="http://schemas.openxmlformats.org/officeDocument/2006/relationships" xmlns:p="http://schemas.openxmlformats.org/presentationml/2006/main">
   <p:cSld>
     <p:bg>
@@ -17379,7 +17859,7 @@
                 <a:tabLst/>
                 <a:defRPr/>
               </a:pPr>
-              <a:t>7</a:t>
+              <a:t>8</a:t>
             </a:fld>
             <a:endParaRPr kumimoji="0" lang="nl-BE" sz="1800" b="0" i="0" u="none" strike="noStrike" kern="0" cap="none" spc="0" normalizeH="0" baseline="0" noProof="0" dirty="0">
               <a:ln>
@@ -17411,7 +17891,7 @@
 </p:sld>
 </file>
 
-<file path=ppt/slides/slide8.xml><?xml version="1.0" encoding="utf-8"?>
+<file path=ppt/slides/slide9.xml><?xml version="1.0" encoding="utf-8"?>
 <p:sld xmlns:a="http://schemas.openxmlformats.org/drawingml/2006/main" xmlns:r="http://schemas.openxmlformats.org/officeDocument/2006/relationships" xmlns:p="http://schemas.openxmlformats.org/presentationml/2006/main">
   <p:cSld>
     <p:spTree>
@@ -17565,12 +18045,47 @@
             <a:endParaRPr lang="nl-BE" sz="2000" dirty="0"/>
           </a:p>
           <a:p>
-            <a:endParaRPr lang="en-US" sz="2000" dirty="0"/>
-          </a:p>
-          <a:p>
             <a:r>
               <a:rPr lang="en-US" sz="2000" dirty="0"/>
               <a:t>Signing of the collaboration agreement is blocked at BOSA-side since March 2024</a:t>
+            </a:r>
+          </a:p>
+          <a:p>
+            <a:endParaRPr lang="en-US" sz="2000" dirty="0"/>
+          </a:p>
+          <a:p>
+            <a:r>
+              <a:rPr lang="en-US" sz="2000" dirty="0"/>
+              <a:t>Foreseen utilization of this budget</a:t>
+            </a:r>
+          </a:p>
+          <a:p>
+            <a:pPr lvl="1"/>
+            <a:r>
+              <a:rPr lang="en-US" sz="2000" dirty="0"/>
+              <a:t>Hydrants					</a:t>
+            </a:r>
+            <a:r>
+              <a:rPr lang="en-US" sz="2000" dirty="0">
+                <a:highlight>
+                  <a:srgbClr val="FFFF00"/>
+                </a:highlight>
+              </a:rPr>
+              <a:t>? K€</a:t>
+            </a:r>
+          </a:p>
+          <a:p>
+            <a:pPr lvl="1"/>
+            <a:r>
+              <a:rPr lang="en-US" sz="2000" dirty="0"/>
+              <a:t>Person					71.1 K€</a:t>
+            </a:r>
+          </a:p>
+          <a:p>
+            <a:pPr lvl="1"/>
+            <a:r>
+              <a:rPr lang="en-US" sz="2000" dirty="0"/>
+              <a:t>Translation OSLO standards			150 K€</a:t>
             </a:r>
           </a:p>
           <a:p>
@@ -17661,7 +18176,7 @@
           <a:p>
             <a:fld id="{44268F58-7931-46A9-8276-28F54B6737CA}" type="slidenum">
               <a:rPr lang="fr-BE" smtClean="0"/>
-              <a:t>8</a:t>
+              <a:t>9</a:t>
             </a:fld>
             <a:endParaRPr lang="fr-BE"/>
           </a:p>
@@ -17682,7 +18197,7 @@
           <p:nvPr>
             <p:extLst>
               <p:ext uri="{D42A27DB-BD31-4B8C-83A1-F6EECF244321}">
-                <p14:modId xmlns:p14="http://schemas.microsoft.com/office/powerpoint/2010/main" val="3445478014"/>
+                <p14:modId xmlns:p14="http://schemas.microsoft.com/office/powerpoint/2010/main" val="2651802203"/>
               </p:ext>
             </p:extLst>
           </p:nvPr>
@@ -18143,12 +18658,12 @@
                     <a:p>
                       <a:pPr algn="l" fontAlgn="ctr"/>
                       <a:r>
-                        <a:rPr lang="en-US" sz="1200" u="none" strike="noStrike">
+                        <a:rPr lang="en-US" sz="1200" u="none" strike="noStrike" dirty="0">
                           <a:effectLst/>
                         </a:rPr>
-                        <a:t>CIRB (for the Brussels Region)</a:t>
+                        <a:t>Paradigm (for the Brussels Region)</a:t>
                       </a:r>
-                      <a:endParaRPr lang="en-US" sz="1200" b="0" i="0" u="none" strike="noStrike">
+                      <a:endParaRPr lang="en-US" sz="1200" b="0" i="0" u="none" strike="noStrike" dirty="0">
                         <a:solidFill>
                           <a:srgbClr val="000000"/>
                         </a:solidFill>
@@ -18219,12 +18734,60 @@
                     <a:p>
                       <a:pPr algn="l" fontAlgn="ctr"/>
                       <a:r>
-                        <a:rPr lang="nl-BE" sz="1200" u="none" strike="noStrike">
+                        <a:rPr lang="nl-BE" sz="1200" u="none" strike="noStrike" dirty="0">
                           <a:effectLst/>
                         </a:rPr>
-                        <a:t>ETNIC (for the Fédération Wallonie-Bruxelles)</a:t>
+                        <a:t>ETNIC (</a:t>
                       </a:r>
-                      <a:endParaRPr lang="nl-BE" sz="1200" b="0" i="0" u="none" strike="noStrike">
+                      <a:r>
+                        <a:rPr lang="nl-BE" sz="1200" u="none" strike="noStrike" dirty="0" err="1">
+                          <a:effectLst/>
+                        </a:rPr>
+                        <a:t>for</a:t>
+                      </a:r>
+                      <a:r>
+                        <a:rPr lang="nl-BE" sz="1200" u="none" strike="noStrike" dirty="0">
+                          <a:effectLst/>
+                        </a:rPr>
+                        <a:t> </a:t>
+                      </a:r>
+                      <a:r>
+                        <a:rPr lang="nl-BE" sz="1200" u="none" strike="noStrike" dirty="0" err="1">
+                          <a:effectLst/>
+                        </a:rPr>
+                        <a:t>the</a:t>
+                      </a:r>
+                      <a:r>
+                        <a:rPr lang="nl-BE" sz="1200" u="none" strike="noStrike" dirty="0">
+                          <a:effectLst/>
+                        </a:rPr>
+                        <a:t> </a:t>
+                      </a:r>
+                      <a:r>
+                        <a:rPr lang="nl-BE" sz="1200" u="none" strike="noStrike" dirty="0" err="1">
+                          <a:effectLst/>
+                        </a:rPr>
+                        <a:t>Fédération</a:t>
+                      </a:r>
+                      <a:r>
+                        <a:rPr lang="nl-BE" sz="1200" u="none" strike="noStrike" dirty="0">
+                          <a:effectLst/>
+                        </a:rPr>
+                        <a:t> </a:t>
+                      </a:r>
+                      <a:r>
+                        <a:rPr lang="nl-BE" sz="1200" u="none" strike="noStrike" dirty="0" err="1">
+                          <a:effectLst/>
+                        </a:rPr>
+                        <a:t>Wallonie</a:t>
+                      </a:r>
+                      <a:r>
+                        <a:rPr lang="nl-BE" sz="1200" u="none" strike="noStrike" dirty="0">
+                          <a:effectLst/>
+                        </a:rPr>
+                        <a:t>-Bruxelles)</a:t>
+                      </a:r>
+                      <a:endParaRPr lang="nl-BE" sz="1200" b="0" i="0" u="none" strike="noStrike" dirty="0">
                         <a:solidFill>
                           <a:srgbClr val="000000"/>
                         </a:solidFill>
@@ -18461,6 +19024,95 @@
           </a:graphicData>
         </a:graphic>
       </p:graphicFrame>
+      <p:sp>
+        <p:nvSpPr>
+          <p:cNvPr id="5" name="Arrow: Right 4">
+            <a:extLst>
+              <a:ext uri="{FF2B5EF4-FFF2-40B4-BE49-F238E27FC236}">
+                <a16:creationId xmlns:a16="http://schemas.microsoft.com/office/drawing/2014/main" id="{97F9EA8A-0771-4F32-9C61-12F846494CBA}"/>
+              </a:ext>
+            </a:extLst>
+          </p:cNvPr>
+          <p:cNvSpPr/>
+          <p:nvPr/>
+        </p:nvSpPr>
+        <p:spPr>
+          <a:xfrm>
+            <a:off x="20320" y="3284984"/>
+            <a:ext cx="540568" cy="288032"/>
+          </a:xfrm>
+          <a:prstGeom prst="rightArrow">
+            <a:avLst/>
+          </a:prstGeom>
+          <a:solidFill>
+            <a:srgbClr val="FF0000"/>
+          </a:solidFill>
+          <a:ln w="25400" cap="flat">
+            <a:solidFill>
+              <a:srgbClr val="FF0000"/>
+            </a:solidFill>
+            <a:prstDash val="solid"/>
+            <a:bevel/>
+          </a:ln>
+          <a:effectLst>
+            <a:outerShdw blurRad="38100" dist="23000" dir="5400000" rotWithShape="0">
+              <a:srgbClr val="000000">
+                <a:alpha val="35000"/>
+              </a:srgbClr>
+            </a:outerShdw>
+          </a:effectLst>
+        </p:spPr>
+        <p:style>
+          <a:lnRef idx="0">
+            <a:scrgbClr r="0" g="0" b="0"/>
+          </a:lnRef>
+          <a:fillRef idx="0">
+            <a:scrgbClr r="0" g="0" b="0"/>
+          </a:fillRef>
+          <a:effectRef idx="0">
+            <a:scrgbClr r="0" g="0" b="0"/>
+          </a:effectRef>
+          <a:fontRef idx="none"/>
+        </p:style>
+        <p:txBody>
+          <a:bodyPr rot="0" spcFirstLastPara="1" vertOverflow="overflow" horzOverflow="overflow" vert="horz" wrap="square" lIns="45719" tIns="45719" rIns="45719" bIns="45719" numCol="1" spcCol="38100" rtlCol="0" anchor="ctr">
+            <a:spAutoFit/>
+          </a:bodyPr>
+          <a:lstStyle/>
+          <a:p>
+            <a:pPr marL="0" marR="0" indent="0" algn="l" defTabSz="914400" rtl="0" fontAlgn="auto" latinLnBrk="1" hangingPunct="0">
+              <a:lnSpc>
+                <a:spcPct val="100000"/>
+              </a:lnSpc>
+              <a:spcBef>
+                <a:spcPts val="0"/>
+              </a:spcBef>
+              <a:spcAft>
+                <a:spcPts val="0"/>
+              </a:spcAft>
+              <a:buClrTx/>
+              <a:buSzTx/>
+              <a:buFontTx/>
+              <a:buNone/>
+              <a:tabLst/>
+            </a:pPr>
+            <a:endParaRPr kumimoji="0" lang="nl-BE" sz="1800" b="0" i="0" u="none" strike="noStrike" cap="none" spc="0" normalizeH="0" baseline="0">
+              <a:ln>
+                <a:noFill/>
+              </a:ln>
+              <a:solidFill>
+                <a:srgbClr val="000000"/>
+              </a:solidFill>
+              <a:effectLst/>
+              <a:uFillTx/>
+              <a:latin typeface="FlandersArtSans-Regular"/>
+              <a:ea typeface="FlandersArtSans-Regular"/>
+              <a:cs typeface="FlandersArtSans-Regular"/>
+              <a:sym typeface="FlandersArtSans-Regular"/>
+            </a:endParaRPr>
+          </a:p>
+        </p:txBody>
+      </p:sp>
     </p:spTree>
     <p:extLst>
       <p:ext uri="{BB962C8B-B14F-4D97-AF65-F5344CB8AC3E}">

</xml_diff>

<commit_message>
Updated support doc for ICEG meeting of 26/6
</commit_message>
<xml_diff>
--- a/Meetings/2024-06-12/ICEG_standardisation_20240626.pptx
+++ b/Meetings/2024-06-12/ICEG_standardisation_20240626.pptx
@@ -230,7 +230,7 @@
           <a:p>
             <a:fld id="{78202C0A-ADA1-4A7A-B30B-8168BD3E77CD}" type="datetimeFigureOut">
               <a:rPr lang="nl-BE" smtClean="0"/>
-              <a:t>12/06/2024</a:t>
+              <a:t>21/06/2024</a:t>
             </a:fld>
             <a:endParaRPr lang="nl-BE"/>
           </a:p>
@@ -3175,7 +3175,7 @@
           <a:p>
             <a:fld id="{C0993ED9-3DCE-40DA-81CF-75AAD6A342EB}" type="datetime1">
               <a:rPr lang="fr-BE" smtClean="0"/>
-              <a:t>12-06-24</a:t>
+              <a:t>21-06-24</a:t>
             </a:fld>
             <a:endParaRPr lang="nl-BE" dirty="0"/>
           </a:p>
@@ -3665,7 +3665,7 @@
           <a:p>
             <a:fld id="{0E3F91EA-0BCC-41EE-8118-AF65F6DBCCDE}" type="datetime1">
               <a:rPr lang="fr-BE" smtClean="0"/>
-              <a:t>12-06-24</a:t>
+              <a:t>21-06-24</a:t>
             </a:fld>
             <a:endParaRPr lang="nl-BE" dirty="0"/>
           </a:p>
@@ -4155,7 +4155,7 @@
           <a:p>
             <a:fld id="{2FF7AA89-3B42-469E-8572-B4CF817D9269}" type="datetime1">
               <a:rPr lang="fr-BE" smtClean="0"/>
-              <a:t>12-06-24</a:t>
+              <a:t>21-06-24</a:t>
             </a:fld>
             <a:endParaRPr lang="nl-BE" dirty="0"/>
           </a:p>
@@ -4517,7 +4517,7 @@
           <a:p>
             <a:fld id="{EF335835-B6BB-4A1C-924C-B12CB12D2916}" type="datetime1">
               <a:rPr lang="fr-BE" smtClean="0"/>
-              <a:t>12-06-24</a:t>
+              <a:t>21-06-24</a:t>
             </a:fld>
             <a:endParaRPr lang="nl-BE" dirty="0"/>
           </a:p>
@@ -5094,7 +5094,7 @@
           <a:p>
             <a:fld id="{6A8664DB-569D-4D45-BF33-3A32392D039D}" type="datetime1">
               <a:rPr lang="fr-BE" smtClean="0"/>
-              <a:t>12-06-24</a:t>
+              <a:t>21-06-24</a:t>
             </a:fld>
             <a:endParaRPr lang="nl-BE" dirty="0"/>
           </a:p>
@@ -5395,7 +5395,7 @@
           <a:p>
             <a:fld id="{9232A1EE-6E03-4F6F-B90C-B0077B47020F}" type="datetime1">
               <a:rPr lang="fr-BE" smtClean="0"/>
-              <a:t>12-06-24</a:t>
+              <a:t>21-06-24</a:t>
             </a:fld>
             <a:endParaRPr lang="nl-BE" dirty="0"/>
           </a:p>
@@ -8695,7 +8695,7 @@
           <a:p>
             <a:fld id="{C8A1E0ED-C5AD-4687-B0CA-AA8829F13676}" type="datetime1">
               <a:rPr lang="fr-BE" smtClean="0"/>
-              <a:t>12-06-24</a:t>
+              <a:t>21-06-24</a:t>
             </a:fld>
             <a:endParaRPr lang="nl-BE" dirty="0"/>
           </a:p>
@@ -11597,7 +11597,7 @@
           <a:p>
             <a:fld id="{60540C07-64E6-4D00-B2D7-3D0338A4E8AC}" type="datetime1">
               <a:rPr lang="fr-BE" smtClean="0"/>
-              <a:t>12-06-24</a:t>
+              <a:t>21-06-24</a:t>
             </a:fld>
             <a:endParaRPr lang="fr-BE"/>
           </a:p>
@@ -12467,7 +12467,7 @@
           </a:ln>
           <a:extLst>
             <a:ext uri="{C572A759-6A51-4108-AA02-DFA0A04FC94B}">
-              <ma14:wrappingTextBoxFlag xmlns:ma14="http://schemas.microsoft.com/office/mac/drawingml/2011/main" xmlns="" val="1"/>
+              <ma14:wrappingTextBoxFlag xmlns="" xmlns:ma14="http://schemas.microsoft.com/office/mac/drawingml/2011/main" val="1"/>
             </a:ext>
           </a:extLst>
         </p:spPr>
@@ -12510,7 +12510,7 @@
           </a:ln>
           <a:extLst>
             <a:ext uri="{C572A759-6A51-4108-AA02-DFA0A04FC94B}">
-              <ma14:wrappingTextBoxFlag xmlns:ma14="http://schemas.microsoft.com/office/mac/drawingml/2011/main" xmlns="" val="1"/>
+              <ma14:wrappingTextBoxFlag xmlns="" xmlns:ma14="http://schemas.microsoft.com/office/mac/drawingml/2011/main" val="1"/>
             </a:ext>
           </a:extLst>
         </p:spPr>
@@ -13313,7 +13313,7 @@
           <a:p>
             <a:fld id="{6D3FB3B6-A9D4-44B3-871F-37B53C152208}" type="datetime1">
               <a:rPr lang="fr-BE" smtClean="0"/>
-              <a:t>12-06-24</a:t>
+              <a:t>21-06-24</a:t>
             </a:fld>
             <a:endParaRPr lang="nl-BE" dirty="0"/>
           </a:p>
@@ -14220,7 +14220,7 @@
           </a:ln>
           <a:extLst>
             <a:ext uri="{C572A759-6A51-4108-AA02-DFA0A04FC94B}">
-              <ma14:wrappingTextBoxFlag xmlns:ma14="http://schemas.microsoft.com/office/mac/drawingml/2011/main" xmlns="" val="1"/>
+              <ma14:wrappingTextBoxFlag xmlns="" xmlns:ma14="http://schemas.microsoft.com/office/mac/drawingml/2011/main" val="1"/>
             </a:ext>
           </a:extLst>
         </p:spPr>
@@ -14263,7 +14263,7 @@
           </a:ln>
           <a:extLst>
             <a:ext uri="{C572A759-6A51-4108-AA02-DFA0A04FC94B}">
-              <ma14:wrappingTextBoxFlag xmlns:ma14="http://schemas.microsoft.com/office/mac/drawingml/2011/main" xmlns="" val="1"/>
+              <ma14:wrappingTextBoxFlag xmlns="" xmlns:ma14="http://schemas.microsoft.com/office/mac/drawingml/2011/main" val="1"/>
             </a:ext>
           </a:extLst>
         </p:spPr>
@@ -14749,7 +14749,7 @@
           </a:ln>
           <a:extLst>
             <a:ext uri="{C572A759-6A51-4108-AA02-DFA0A04FC94B}">
-              <ma14:wrappingTextBoxFlag xmlns:ma14="http://schemas.microsoft.com/office/mac/drawingml/2011/main" xmlns="" val="1"/>
+              <ma14:wrappingTextBoxFlag xmlns="" xmlns:ma14="http://schemas.microsoft.com/office/mac/drawingml/2011/main" val="1"/>
             </a:ext>
           </a:extLst>
         </p:spPr>
@@ -14784,7 +14784,7 @@
           </a:ln>
           <a:extLst>
             <a:ext uri="{C572A759-6A51-4108-AA02-DFA0A04FC94B}">
-              <ma14:wrappingTextBoxFlag xmlns:ma14="http://schemas.microsoft.com/office/mac/drawingml/2011/main" xmlns="" val="1"/>
+              <ma14:wrappingTextBoxFlag xmlns="" xmlns:ma14="http://schemas.microsoft.com/office/mac/drawingml/2011/main" val="1"/>
             </a:ext>
           </a:extLst>
         </p:spPr>
@@ -14976,7 +14976,7 @@
                   <a:schemeClr val="bg1"/>
                 </a:solidFill>
               </a:rPr>
-              <a:t>, Rink Kruk</a:t>
+              <a:t> (Paradigm), Rink Kruk (NGI)</a:t>
             </a:r>
             <a:endParaRPr lang="en-US" sz="4600" b="0" dirty="0">
               <a:solidFill>
@@ -16114,15 +16114,7 @@
             </a:r>
             <a:r>
               <a:rPr lang="nl-BE" sz="2000" dirty="0"/>
-              <a:t>: 20 MD </a:t>
-            </a:r>
-            <a:r>
-              <a:rPr lang="nl-BE" sz="2000" dirty="0">
-                <a:highlight>
-                  <a:srgbClr val="FFFF00"/>
-                </a:highlight>
-              </a:rPr>
-              <a:t>(in € ?)</a:t>
+              <a:t>: 20 MD (15206 €)</a:t>
             </a:r>
           </a:p>
           <a:p>
@@ -18063,15 +18055,7 @@
             <a:pPr lvl="1"/>
             <a:r>
               <a:rPr lang="en-US" sz="2000" dirty="0"/>
-              <a:t>Hydrants					</a:t>
-            </a:r>
-            <a:r>
-              <a:rPr lang="en-US" sz="2000" dirty="0">
-                <a:highlight>
-                  <a:srgbClr val="FFFF00"/>
-                </a:highlight>
-              </a:rPr>
-              <a:t>? K€</a:t>
+              <a:t>Hydrants					15206 €</a:t>
             </a:r>
           </a:p>
           <a:p>
@@ -23270,6 +23254,52 @@
 </file>
 
 <file path=customXml/item1.xml><?xml version="1.0" encoding="utf-8"?>
+<p:properties xmlns:p="http://schemas.microsoft.com/office/2006/metadata/properties" xmlns:xsi="http://www.w3.org/2001/XMLSchema-instance" xmlns:pc="http://schemas.microsoft.com/office/infopath/2007/PartnerControls">
+  <documentManagement>
+    <_x0063_bw3 xmlns="d8af5a5f-e2e6-468c-9f28-f81d99523fed">
+      <UserInfo>
+        <DisplayName/>
+        <AccountId xsi:nil="true"/>
+        <AccountType/>
+      </UserInfo>
+    </_x0063_bw3>
+    <y2ot xmlns="d8af5a5f-e2e6-468c-9f28-f81d99523fed" xsi:nil="true"/>
+    <Comment xmlns="d8af5a5f-e2e6-468c-9f28-f81d99523fed" xsi:nil="true"/>
+    <lcf76f155ced4ddcb4097134ff3c332f xmlns="d8af5a5f-e2e6-468c-9f28-f81d99523fed">
+      <Terms xmlns="http://schemas.microsoft.com/office/infopath/2007/PartnerControls"/>
+    </lcf76f155ced4ddcb4097134ff3c332f>
+    <TaxCatchAll xmlns="9a9ec0f0-7796-43d0-ac1f-4c8c46ee0bd1" xsi:nil="true"/>
+    <SharedWithUsers xmlns="abd5de4e-6ecd-4522-a9f4-1c24c7648312">
+      <UserInfo>
+        <DisplayName>Pletinckx Sven</DisplayName>
+        <AccountId>175</AccountId>
+        <AccountType/>
+      </UserInfo>
+      <UserInfo>
+        <DisplayName>Vanderstraete Tony</DisplayName>
+        <AccountId>130</AccountId>
+        <AccountType/>
+      </UserInfo>
+      <UserInfo>
+        <DisplayName>Smedts Jan</DisplayName>
+        <AccountId>2759</AccountId>
+        <AccountType/>
+      </UserInfo>
+    </SharedWithUsers>
+  </documentManagement>
+</p:properties>
+</file>
+
+<file path=customXml/item2.xml><?xml version="1.0" encoding="utf-8"?>
+<?mso-contentType ?>
+<FormTemplates xmlns="http://schemas.microsoft.com/sharepoint/v3/contenttype/forms">
+  <Display>DocumentLibraryForm</Display>
+  <Edit>DocumentLibraryForm</Edit>
+  <New>DocumentLibraryForm</New>
+</FormTemplates>
+</file>
+
+<file path=customXml/item3.xml><?xml version="1.0" encoding="utf-8"?>
 <ct:contentTypeSchema xmlns:ct="http://schemas.microsoft.com/office/2006/metadata/contentType" xmlns:ma="http://schemas.microsoft.com/office/2006/metadata/properties/metaAttributes" ct:_="" ma:_="" ma:contentTypeName="Document" ma:contentTypeID="0x0101007D2FA61B056BF04BB41EAF8746BED8CA" ma:contentTypeVersion="21" ma:contentTypeDescription="Create a new document." ma:contentTypeScope="" ma:versionID="20c5ff2fe643e2f9168d43a073f0367c">
   <xsd:schema xmlns:xsd="http://www.w3.org/2001/XMLSchema" xmlns:xs="http://www.w3.org/2001/XMLSchema" xmlns:p="http://schemas.microsoft.com/office/2006/metadata/properties" xmlns:ns2="abd5de4e-6ecd-4522-a9f4-1c24c7648312" xmlns:ns3="d8af5a5f-e2e6-468c-9f28-f81d99523fed" xmlns:ns4="9a9ec0f0-7796-43d0-ac1f-4c8c46ee0bd1" targetNamespace="http://schemas.microsoft.com/office/2006/metadata/properties" ma:root="true" ma:fieldsID="0af9a46cfb80bca757dbbb7442467b8d" ns2:_="" ns3:_="" ns4:_="">
     <xsd:import namespace="abd5de4e-6ecd-4522-a9f4-1c24c7648312"/>
@@ -23551,53 +23581,33 @@
 </ct:contentTypeSchema>
 </file>
 
-<file path=customXml/item2.xml><?xml version="1.0" encoding="utf-8"?>
-<?mso-contentType ?>
-<FormTemplates xmlns="http://schemas.microsoft.com/sharepoint/v3/contenttype/forms">
-  <Display>DocumentLibraryForm</Display>
-  <Edit>DocumentLibraryForm</Edit>
-  <New>DocumentLibraryForm</New>
-</FormTemplates>
+<file path=customXml/itemProps1.xml><?xml version="1.0" encoding="utf-8"?>
+<ds:datastoreItem xmlns:ds="http://schemas.openxmlformats.org/officeDocument/2006/customXml" ds:itemID="{6138AF13-011E-486F-8BD0-66514154D91E}">
+  <ds:schemaRefs>
+    <ds:schemaRef ds:uri="http://schemas.microsoft.com/office/2006/documentManagement/types"/>
+    <ds:schemaRef ds:uri="http://www.w3.org/XML/1998/namespace"/>
+    <ds:schemaRef ds:uri="http://purl.org/dc/elements/1.1/"/>
+    <ds:schemaRef ds:uri="abd5de4e-6ecd-4522-a9f4-1c24c7648312"/>
+    <ds:schemaRef ds:uri="d8af5a5f-e2e6-468c-9f28-f81d99523fed"/>
+    <ds:schemaRef ds:uri="http://purl.org/dc/terms/"/>
+    <ds:schemaRef ds:uri="http://schemas.microsoft.com/office/infopath/2007/PartnerControls"/>
+    <ds:schemaRef ds:uri="http://schemas.openxmlformats.org/package/2006/metadata/core-properties"/>
+    <ds:schemaRef ds:uri="9a9ec0f0-7796-43d0-ac1f-4c8c46ee0bd1"/>
+    <ds:schemaRef ds:uri="http://schemas.microsoft.com/office/2006/metadata/properties"/>
+    <ds:schemaRef ds:uri="http://purl.org/dc/dcmitype/"/>
+  </ds:schemaRefs>
+</ds:datastoreItem>
 </file>
 
-<file path=customXml/item3.xml><?xml version="1.0" encoding="utf-8"?>
-<p:properties xmlns:p="http://schemas.microsoft.com/office/2006/metadata/properties" xmlns:xsi="http://www.w3.org/2001/XMLSchema-instance" xmlns:pc="http://schemas.microsoft.com/office/infopath/2007/PartnerControls">
-  <documentManagement>
-    <_x0063_bw3 xmlns="d8af5a5f-e2e6-468c-9f28-f81d99523fed">
-      <UserInfo>
-        <DisplayName/>
-        <AccountId xsi:nil="true"/>
-        <AccountType/>
-      </UserInfo>
-    </_x0063_bw3>
-    <y2ot xmlns="d8af5a5f-e2e6-468c-9f28-f81d99523fed" xsi:nil="true"/>
-    <Comment xmlns="d8af5a5f-e2e6-468c-9f28-f81d99523fed" xsi:nil="true"/>
-    <lcf76f155ced4ddcb4097134ff3c332f xmlns="d8af5a5f-e2e6-468c-9f28-f81d99523fed">
-      <Terms xmlns="http://schemas.microsoft.com/office/infopath/2007/PartnerControls"/>
-    </lcf76f155ced4ddcb4097134ff3c332f>
-    <TaxCatchAll xmlns="9a9ec0f0-7796-43d0-ac1f-4c8c46ee0bd1" xsi:nil="true"/>
-    <SharedWithUsers xmlns="abd5de4e-6ecd-4522-a9f4-1c24c7648312">
-      <UserInfo>
-        <DisplayName>Pletinckx Sven</DisplayName>
-        <AccountId>175</AccountId>
-        <AccountType/>
-      </UserInfo>
-      <UserInfo>
-        <DisplayName>Vanderstraete Tony</DisplayName>
-        <AccountId>130</AccountId>
-        <AccountType/>
-      </UserInfo>
-      <UserInfo>
-        <DisplayName>Smedts Jan</DisplayName>
-        <AccountId>2759</AccountId>
-        <AccountType/>
-      </UserInfo>
-    </SharedWithUsers>
-  </documentManagement>
-</p:properties>
+<file path=customXml/itemProps2.xml><?xml version="1.0" encoding="utf-8"?>
+<ds:datastoreItem xmlns:ds="http://schemas.openxmlformats.org/officeDocument/2006/customXml" ds:itemID="{11096C34-B6FF-40DB-957D-791CD9E02A3C}">
+  <ds:schemaRefs>
+    <ds:schemaRef ds:uri="http://schemas.microsoft.com/sharepoint/v3/contenttype/forms"/>
+  </ds:schemaRefs>
+</ds:datastoreItem>
 </file>
 
-<file path=customXml/itemProps1.xml><?xml version="1.0" encoding="utf-8"?>
+<file path=customXml/itemProps3.xml><?xml version="1.0" encoding="utf-8"?>
 <ds:datastoreItem xmlns:ds="http://schemas.openxmlformats.org/officeDocument/2006/customXml" ds:itemID="{0B18F1C9-9E06-4265-8DDB-37844D5AD393}">
   <ds:schemaRefs>
     <ds:schemaRef ds:uri="http://schemas.microsoft.com/office/2006/metadata/contentType"/>
@@ -23615,30 +23625,4 @@
     <ds:schemaRef ds:uri="http://schemas.microsoft.com/internal/obd"/>
   </ds:schemaRefs>
 </ds:datastoreItem>
-</file>
-
-<file path=customXml/itemProps2.xml><?xml version="1.0" encoding="utf-8"?>
-<ds:datastoreItem xmlns:ds="http://schemas.openxmlformats.org/officeDocument/2006/customXml" ds:itemID="{11096C34-B6FF-40DB-957D-791CD9E02A3C}">
-  <ds:schemaRefs>
-    <ds:schemaRef ds:uri="http://schemas.microsoft.com/sharepoint/v3/contenttype/forms"/>
-  </ds:schemaRefs>
-</ds:datastoreItem>
-</file>
-
-<file path=customXml/itemProps3.xml><?xml version="1.0" encoding="utf-8"?>
-<ds:datastoreItem xmlns:ds="http://schemas.openxmlformats.org/officeDocument/2006/customXml" ds:itemID="{6138AF13-011E-486F-8BD0-66514154D91E}">
-  <ds:schemaRefs>
-    <ds:schemaRef ds:uri="http://schemas.microsoft.com/office/2006/documentManagement/types"/>
-    <ds:schemaRef ds:uri="http://www.w3.org/XML/1998/namespace"/>
-    <ds:schemaRef ds:uri="http://purl.org/dc/elements/1.1/"/>
-    <ds:schemaRef ds:uri="abd5de4e-6ecd-4522-a9f4-1c24c7648312"/>
-    <ds:schemaRef ds:uri="d8af5a5f-e2e6-468c-9f28-f81d99523fed"/>
-    <ds:schemaRef ds:uri="http://purl.org/dc/terms/"/>
-    <ds:schemaRef ds:uri="http://schemas.microsoft.com/office/infopath/2007/PartnerControls"/>
-    <ds:schemaRef ds:uri="http://schemas.openxmlformats.org/package/2006/metadata/core-properties"/>
-    <ds:schemaRef ds:uri="9a9ec0f0-7796-43d0-ac1f-4c8c46ee0bd1"/>
-    <ds:schemaRef ds:uri="http://schemas.microsoft.com/office/2006/metadata/properties"/>
-    <ds:schemaRef ds:uri="http://purl.org/dc/dcmitype/"/>
-  </ds:schemaRefs>
-</ds:datastoreItem>
 </file>
</xml_diff>

<commit_message>
Updated add.budget for Hydrants
Cfr mail received from PwC on 2024-06-21
</commit_message>
<xml_diff>
--- a/Meetings/2024-06-12/ICEG_standardisation_20240626.pptx
+++ b/Meetings/2024-06-12/ICEG_standardisation_20240626.pptx
@@ -230,7 +230,7 @@
           <a:p>
             <a:fld id="{78202C0A-ADA1-4A7A-B30B-8168BD3E77CD}" type="datetimeFigureOut">
               <a:rPr lang="nl-BE" smtClean="0"/>
-              <a:t>21/06/2024</a:t>
+              <a:t>24/06/2024</a:t>
             </a:fld>
             <a:endParaRPr lang="nl-BE"/>
           </a:p>
@@ -3175,7 +3175,7 @@
           <a:p>
             <a:fld id="{C0993ED9-3DCE-40DA-81CF-75AAD6A342EB}" type="datetime1">
               <a:rPr lang="fr-BE" smtClean="0"/>
-              <a:t>21-06-24</a:t>
+              <a:t>24-06-24</a:t>
             </a:fld>
             <a:endParaRPr lang="nl-BE" dirty="0"/>
           </a:p>
@@ -3665,7 +3665,7 @@
           <a:p>
             <a:fld id="{0E3F91EA-0BCC-41EE-8118-AF65F6DBCCDE}" type="datetime1">
               <a:rPr lang="fr-BE" smtClean="0"/>
-              <a:t>21-06-24</a:t>
+              <a:t>24-06-24</a:t>
             </a:fld>
             <a:endParaRPr lang="nl-BE" dirty="0"/>
           </a:p>
@@ -4155,7 +4155,7 @@
           <a:p>
             <a:fld id="{2FF7AA89-3B42-469E-8572-B4CF817D9269}" type="datetime1">
               <a:rPr lang="fr-BE" smtClean="0"/>
-              <a:t>21-06-24</a:t>
+              <a:t>24-06-24</a:t>
             </a:fld>
             <a:endParaRPr lang="nl-BE" dirty="0"/>
           </a:p>
@@ -4517,7 +4517,7 @@
           <a:p>
             <a:fld id="{EF335835-B6BB-4A1C-924C-B12CB12D2916}" type="datetime1">
               <a:rPr lang="fr-BE" smtClean="0"/>
-              <a:t>21-06-24</a:t>
+              <a:t>24-06-24</a:t>
             </a:fld>
             <a:endParaRPr lang="nl-BE" dirty="0"/>
           </a:p>
@@ -5094,7 +5094,7 @@
           <a:p>
             <a:fld id="{6A8664DB-569D-4D45-BF33-3A32392D039D}" type="datetime1">
               <a:rPr lang="fr-BE" smtClean="0"/>
-              <a:t>21-06-24</a:t>
+              <a:t>24-06-24</a:t>
             </a:fld>
             <a:endParaRPr lang="nl-BE" dirty="0"/>
           </a:p>
@@ -5395,7 +5395,7 @@
           <a:p>
             <a:fld id="{9232A1EE-6E03-4F6F-B90C-B0077B47020F}" type="datetime1">
               <a:rPr lang="fr-BE" smtClean="0"/>
-              <a:t>21-06-24</a:t>
+              <a:t>24-06-24</a:t>
             </a:fld>
             <a:endParaRPr lang="nl-BE" dirty="0"/>
           </a:p>
@@ -8695,7 +8695,7 @@
           <a:p>
             <a:fld id="{C8A1E0ED-C5AD-4687-B0CA-AA8829F13676}" type="datetime1">
               <a:rPr lang="fr-BE" smtClean="0"/>
-              <a:t>21-06-24</a:t>
+              <a:t>24-06-24</a:t>
             </a:fld>
             <a:endParaRPr lang="nl-BE" dirty="0"/>
           </a:p>
@@ -11597,7 +11597,7 @@
           <a:p>
             <a:fld id="{60540C07-64E6-4D00-B2D7-3D0338A4E8AC}" type="datetime1">
               <a:rPr lang="fr-BE" smtClean="0"/>
-              <a:t>21-06-24</a:t>
+              <a:t>24-06-24</a:t>
             </a:fld>
             <a:endParaRPr lang="fr-BE"/>
           </a:p>
@@ -12467,7 +12467,7 @@
           </a:ln>
           <a:extLst>
             <a:ext uri="{C572A759-6A51-4108-AA02-DFA0A04FC94B}">
-              <ma14:wrappingTextBoxFlag xmlns="" xmlns:ma14="http://schemas.microsoft.com/office/mac/drawingml/2011/main" val="1"/>
+              <ma14:wrappingTextBoxFlag xmlns:ma14="http://schemas.microsoft.com/office/mac/drawingml/2011/main" xmlns="" val="1"/>
             </a:ext>
           </a:extLst>
         </p:spPr>
@@ -12510,7 +12510,7 @@
           </a:ln>
           <a:extLst>
             <a:ext uri="{C572A759-6A51-4108-AA02-DFA0A04FC94B}">
-              <ma14:wrappingTextBoxFlag xmlns="" xmlns:ma14="http://schemas.microsoft.com/office/mac/drawingml/2011/main" val="1"/>
+              <ma14:wrappingTextBoxFlag xmlns:ma14="http://schemas.microsoft.com/office/mac/drawingml/2011/main" xmlns="" val="1"/>
             </a:ext>
           </a:extLst>
         </p:spPr>
@@ -13313,7 +13313,7 @@
           <a:p>
             <a:fld id="{6D3FB3B6-A9D4-44B3-871F-37B53C152208}" type="datetime1">
               <a:rPr lang="fr-BE" smtClean="0"/>
-              <a:t>21-06-24</a:t>
+              <a:t>24-06-24</a:t>
             </a:fld>
             <a:endParaRPr lang="nl-BE" dirty="0"/>
           </a:p>
@@ -14220,7 +14220,7 @@
           </a:ln>
           <a:extLst>
             <a:ext uri="{C572A759-6A51-4108-AA02-DFA0A04FC94B}">
-              <ma14:wrappingTextBoxFlag xmlns="" xmlns:ma14="http://schemas.microsoft.com/office/mac/drawingml/2011/main" val="1"/>
+              <ma14:wrappingTextBoxFlag xmlns:ma14="http://schemas.microsoft.com/office/mac/drawingml/2011/main" xmlns="" val="1"/>
             </a:ext>
           </a:extLst>
         </p:spPr>
@@ -14263,7 +14263,7 @@
           </a:ln>
           <a:extLst>
             <a:ext uri="{C572A759-6A51-4108-AA02-DFA0A04FC94B}">
-              <ma14:wrappingTextBoxFlag xmlns="" xmlns:ma14="http://schemas.microsoft.com/office/mac/drawingml/2011/main" val="1"/>
+              <ma14:wrappingTextBoxFlag xmlns:ma14="http://schemas.microsoft.com/office/mac/drawingml/2011/main" xmlns="" val="1"/>
             </a:ext>
           </a:extLst>
         </p:spPr>
@@ -14749,7 +14749,7 @@
           </a:ln>
           <a:extLst>
             <a:ext uri="{C572A759-6A51-4108-AA02-DFA0A04FC94B}">
-              <ma14:wrappingTextBoxFlag xmlns="" xmlns:ma14="http://schemas.microsoft.com/office/mac/drawingml/2011/main" val="1"/>
+              <ma14:wrappingTextBoxFlag xmlns:ma14="http://schemas.microsoft.com/office/mac/drawingml/2011/main" xmlns="" val="1"/>
             </a:ext>
           </a:extLst>
         </p:spPr>
@@ -14784,7 +14784,7 @@
           </a:ln>
           <a:extLst>
             <a:ext uri="{C572A759-6A51-4108-AA02-DFA0A04FC94B}">
-              <ma14:wrappingTextBoxFlag xmlns="" xmlns:ma14="http://schemas.microsoft.com/office/mac/drawingml/2011/main" val="1"/>
+              <ma14:wrappingTextBoxFlag xmlns:ma14="http://schemas.microsoft.com/office/mac/drawingml/2011/main" xmlns="" val="1"/>
             </a:ext>
           </a:extLst>
         </p:spPr>
@@ -15461,12 +15461,16 @@
           <a:p>
             <a:pPr lvl="1"/>
             <a:r>
-              <a:rPr lang="nl-BE" sz="2000" dirty="0" err="1"/>
+              <a:rPr lang="nl-BE" sz="2000" b="1" dirty="0" err="1"/>
               <a:t>Mobility</a:t>
             </a:r>
             <a:r>
+              <a:rPr lang="nl-BE" sz="2000" b="1" dirty="0"/>
+              <a:t>: IMKL standard </a:t>
+            </a:r>
+            <a:r>
               <a:rPr lang="nl-BE" sz="2000" dirty="0"/>
-              <a:t>: IMKL standard (</a:t>
+              <a:t>(</a:t>
             </a:r>
             <a:r>
               <a:rPr lang="nl-BE" sz="2000" dirty="0" err="1"/>
@@ -16114,7 +16118,7 @@
             </a:r>
             <a:r>
               <a:rPr lang="nl-BE" sz="2000" dirty="0"/>
-              <a:t>: 20 MD (15206 €)</a:t>
+              <a:t>: 20 MD (18170 €)</a:t>
             </a:r>
           </a:p>
           <a:p>
@@ -16531,6 +16535,12 @@
           <a:lstStyle/>
           <a:p>
             <a:r>
+              <a:rPr lang="nl-BE" sz="2000" b="1" dirty="0"/>
+              <a:t>Persons</a:t>
+            </a:r>
+          </a:p>
+          <a:p>
+            <a:r>
               <a:rPr lang="nl-BE" sz="2000" dirty="0"/>
               <a:t>On </a:t>
             </a:r>
@@ -16732,7 +16742,7 @@
         </p:nvSpPr>
         <p:spPr>
           <a:xfrm>
-            <a:off x="457200" y="2557841"/>
+            <a:off x="449000" y="2924944"/>
             <a:ext cx="720080" cy="288032"/>
           </a:xfrm>
           <a:prstGeom prst="rightArrow">
@@ -18055,7 +18065,15 @@
             <a:pPr lvl="1"/>
             <a:r>
               <a:rPr lang="en-US" sz="2000" dirty="0"/>
-              <a:t>Hydrants					15206 €</a:t>
+              <a:t>Hydrants				</a:t>
+            </a:r>
+            <a:r>
+              <a:rPr lang="en-US" sz="2000"/>
+              <a:t>	18170 </a:t>
+            </a:r>
+            <a:r>
+              <a:rPr lang="en-US" sz="2000" dirty="0"/>
+              <a:t>€</a:t>
             </a:r>
           </a:p>
           <a:p>
@@ -23254,52 +23272,6 @@
 </file>
 
 <file path=customXml/item1.xml><?xml version="1.0" encoding="utf-8"?>
-<p:properties xmlns:p="http://schemas.microsoft.com/office/2006/metadata/properties" xmlns:xsi="http://www.w3.org/2001/XMLSchema-instance" xmlns:pc="http://schemas.microsoft.com/office/infopath/2007/PartnerControls">
-  <documentManagement>
-    <_x0063_bw3 xmlns="d8af5a5f-e2e6-468c-9f28-f81d99523fed">
-      <UserInfo>
-        <DisplayName/>
-        <AccountId xsi:nil="true"/>
-        <AccountType/>
-      </UserInfo>
-    </_x0063_bw3>
-    <y2ot xmlns="d8af5a5f-e2e6-468c-9f28-f81d99523fed" xsi:nil="true"/>
-    <Comment xmlns="d8af5a5f-e2e6-468c-9f28-f81d99523fed" xsi:nil="true"/>
-    <lcf76f155ced4ddcb4097134ff3c332f xmlns="d8af5a5f-e2e6-468c-9f28-f81d99523fed">
-      <Terms xmlns="http://schemas.microsoft.com/office/infopath/2007/PartnerControls"/>
-    </lcf76f155ced4ddcb4097134ff3c332f>
-    <TaxCatchAll xmlns="9a9ec0f0-7796-43d0-ac1f-4c8c46ee0bd1" xsi:nil="true"/>
-    <SharedWithUsers xmlns="abd5de4e-6ecd-4522-a9f4-1c24c7648312">
-      <UserInfo>
-        <DisplayName>Pletinckx Sven</DisplayName>
-        <AccountId>175</AccountId>
-        <AccountType/>
-      </UserInfo>
-      <UserInfo>
-        <DisplayName>Vanderstraete Tony</DisplayName>
-        <AccountId>130</AccountId>
-        <AccountType/>
-      </UserInfo>
-      <UserInfo>
-        <DisplayName>Smedts Jan</DisplayName>
-        <AccountId>2759</AccountId>
-        <AccountType/>
-      </UserInfo>
-    </SharedWithUsers>
-  </documentManagement>
-</p:properties>
-</file>
-
-<file path=customXml/item2.xml><?xml version="1.0" encoding="utf-8"?>
-<?mso-contentType ?>
-<FormTemplates xmlns="http://schemas.microsoft.com/sharepoint/v3/contenttype/forms">
-  <Display>DocumentLibraryForm</Display>
-  <Edit>DocumentLibraryForm</Edit>
-  <New>DocumentLibraryForm</New>
-</FormTemplates>
-</file>
-
-<file path=customXml/item3.xml><?xml version="1.0" encoding="utf-8"?>
 <ct:contentTypeSchema xmlns:ct="http://schemas.microsoft.com/office/2006/metadata/contentType" xmlns:ma="http://schemas.microsoft.com/office/2006/metadata/properties/metaAttributes" ct:_="" ma:_="" ma:contentTypeName="Document" ma:contentTypeID="0x0101007D2FA61B056BF04BB41EAF8746BED8CA" ma:contentTypeVersion="21" ma:contentTypeDescription="Create a new document." ma:contentTypeScope="" ma:versionID="20c5ff2fe643e2f9168d43a073f0367c">
   <xsd:schema xmlns:xsd="http://www.w3.org/2001/XMLSchema" xmlns:xs="http://www.w3.org/2001/XMLSchema" xmlns:p="http://schemas.microsoft.com/office/2006/metadata/properties" xmlns:ns2="abd5de4e-6ecd-4522-a9f4-1c24c7648312" xmlns:ns3="d8af5a5f-e2e6-468c-9f28-f81d99523fed" xmlns:ns4="9a9ec0f0-7796-43d0-ac1f-4c8c46ee0bd1" targetNamespace="http://schemas.microsoft.com/office/2006/metadata/properties" ma:root="true" ma:fieldsID="0af9a46cfb80bca757dbbb7442467b8d" ns2:_="" ns3:_="" ns4:_="">
     <xsd:import namespace="abd5de4e-6ecd-4522-a9f4-1c24c7648312"/>
@@ -23581,33 +23553,53 @@
 </ct:contentTypeSchema>
 </file>
 
-<file path=customXml/itemProps1.xml><?xml version="1.0" encoding="utf-8"?>
-<ds:datastoreItem xmlns:ds="http://schemas.openxmlformats.org/officeDocument/2006/customXml" ds:itemID="{6138AF13-011E-486F-8BD0-66514154D91E}">
-  <ds:schemaRefs>
-    <ds:schemaRef ds:uri="http://schemas.microsoft.com/office/2006/documentManagement/types"/>
-    <ds:schemaRef ds:uri="http://www.w3.org/XML/1998/namespace"/>
-    <ds:schemaRef ds:uri="http://purl.org/dc/elements/1.1/"/>
-    <ds:schemaRef ds:uri="abd5de4e-6ecd-4522-a9f4-1c24c7648312"/>
-    <ds:schemaRef ds:uri="d8af5a5f-e2e6-468c-9f28-f81d99523fed"/>
-    <ds:schemaRef ds:uri="http://purl.org/dc/terms/"/>
-    <ds:schemaRef ds:uri="http://schemas.microsoft.com/office/infopath/2007/PartnerControls"/>
-    <ds:schemaRef ds:uri="http://schemas.openxmlformats.org/package/2006/metadata/core-properties"/>
-    <ds:schemaRef ds:uri="9a9ec0f0-7796-43d0-ac1f-4c8c46ee0bd1"/>
-    <ds:schemaRef ds:uri="http://schemas.microsoft.com/office/2006/metadata/properties"/>
-    <ds:schemaRef ds:uri="http://purl.org/dc/dcmitype/"/>
-  </ds:schemaRefs>
-</ds:datastoreItem>
+<file path=customXml/item2.xml><?xml version="1.0" encoding="utf-8"?>
+<?mso-contentType ?>
+<FormTemplates xmlns="http://schemas.microsoft.com/sharepoint/v3/contenttype/forms">
+  <Display>DocumentLibraryForm</Display>
+  <Edit>DocumentLibraryForm</Edit>
+  <New>DocumentLibraryForm</New>
+</FormTemplates>
 </file>
 
-<file path=customXml/itemProps2.xml><?xml version="1.0" encoding="utf-8"?>
-<ds:datastoreItem xmlns:ds="http://schemas.openxmlformats.org/officeDocument/2006/customXml" ds:itemID="{11096C34-B6FF-40DB-957D-791CD9E02A3C}">
-  <ds:schemaRefs>
-    <ds:schemaRef ds:uri="http://schemas.microsoft.com/sharepoint/v3/contenttype/forms"/>
-  </ds:schemaRefs>
-</ds:datastoreItem>
+<file path=customXml/item3.xml><?xml version="1.0" encoding="utf-8"?>
+<p:properties xmlns:p="http://schemas.microsoft.com/office/2006/metadata/properties" xmlns:xsi="http://www.w3.org/2001/XMLSchema-instance" xmlns:pc="http://schemas.microsoft.com/office/infopath/2007/PartnerControls">
+  <documentManagement>
+    <_x0063_bw3 xmlns="d8af5a5f-e2e6-468c-9f28-f81d99523fed">
+      <UserInfo>
+        <DisplayName/>
+        <AccountId xsi:nil="true"/>
+        <AccountType/>
+      </UserInfo>
+    </_x0063_bw3>
+    <y2ot xmlns="d8af5a5f-e2e6-468c-9f28-f81d99523fed" xsi:nil="true"/>
+    <Comment xmlns="d8af5a5f-e2e6-468c-9f28-f81d99523fed" xsi:nil="true"/>
+    <lcf76f155ced4ddcb4097134ff3c332f xmlns="d8af5a5f-e2e6-468c-9f28-f81d99523fed">
+      <Terms xmlns="http://schemas.microsoft.com/office/infopath/2007/PartnerControls"/>
+    </lcf76f155ced4ddcb4097134ff3c332f>
+    <TaxCatchAll xmlns="9a9ec0f0-7796-43d0-ac1f-4c8c46ee0bd1" xsi:nil="true"/>
+    <SharedWithUsers xmlns="abd5de4e-6ecd-4522-a9f4-1c24c7648312">
+      <UserInfo>
+        <DisplayName>Pletinckx Sven</DisplayName>
+        <AccountId>175</AccountId>
+        <AccountType/>
+      </UserInfo>
+      <UserInfo>
+        <DisplayName>Vanderstraete Tony</DisplayName>
+        <AccountId>130</AccountId>
+        <AccountType/>
+      </UserInfo>
+      <UserInfo>
+        <DisplayName>Smedts Jan</DisplayName>
+        <AccountId>2759</AccountId>
+        <AccountType/>
+      </UserInfo>
+    </SharedWithUsers>
+  </documentManagement>
+</p:properties>
 </file>
 
-<file path=customXml/itemProps3.xml><?xml version="1.0" encoding="utf-8"?>
+<file path=customXml/itemProps1.xml><?xml version="1.0" encoding="utf-8"?>
 <ds:datastoreItem xmlns:ds="http://schemas.openxmlformats.org/officeDocument/2006/customXml" ds:itemID="{0B18F1C9-9E06-4265-8DDB-37844D5AD393}">
   <ds:schemaRefs>
     <ds:schemaRef ds:uri="http://schemas.microsoft.com/office/2006/metadata/contentType"/>
@@ -23625,4 +23617,30 @@
     <ds:schemaRef ds:uri="http://schemas.microsoft.com/internal/obd"/>
   </ds:schemaRefs>
 </ds:datastoreItem>
+</file>
+
+<file path=customXml/itemProps2.xml><?xml version="1.0" encoding="utf-8"?>
+<ds:datastoreItem xmlns:ds="http://schemas.openxmlformats.org/officeDocument/2006/customXml" ds:itemID="{11096C34-B6FF-40DB-957D-791CD9E02A3C}">
+  <ds:schemaRefs>
+    <ds:schemaRef ds:uri="http://schemas.microsoft.com/sharepoint/v3/contenttype/forms"/>
+  </ds:schemaRefs>
+</ds:datastoreItem>
+</file>
+
+<file path=customXml/itemProps3.xml><?xml version="1.0" encoding="utf-8"?>
+<ds:datastoreItem xmlns:ds="http://schemas.openxmlformats.org/officeDocument/2006/customXml" ds:itemID="{6138AF13-011E-486F-8BD0-66514154D91E}">
+  <ds:schemaRefs>
+    <ds:schemaRef ds:uri="http://schemas.microsoft.com/office/2006/documentManagement/types"/>
+    <ds:schemaRef ds:uri="http://www.w3.org/XML/1998/namespace"/>
+    <ds:schemaRef ds:uri="http://purl.org/dc/elements/1.1/"/>
+    <ds:schemaRef ds:uri="abd5de4e-6ecd-4522-a9f4-1c24c7648312"/>
+    <ds:schemaRef ds:uri="d8af5a5f-e2e6-468c-9f28-f81d99523fed"/>
+    <ds:schemaRef ds:uri="http://purl.org/dc/terms/"/>
+    <ds:schemaRef ds:uri="http://schemas.microsoft.com/office/infopath/2007/PartnerControls"/>
+    <ds:schemaRef ds:uri="http://schemas.openxmlformats.org/package/2006/metadata/core-properties"/>
+    <ds:schemaRef ds:uri="9a9ec0f0-7796-43d0-ac1f-4c8c46ee0bd1"/>
+    <ds:schemaRef ds:uri="http://schemas.microsoft.com/office/2006/metadata/properties"/>
+    <ds:schemaRef ds:uri="http://purl.org/dc/dcmitype/"/>
+  </ds:schemaRefs>
+</ds:datastoreItem>
 </file>
</xml_diff>